<commit_message>
vault backup: 2024-01-31 23:56:27
</commit_message>
<xml_diff>
--- a/Notebook/CUPGE/S2/Anglais/Forensic.pptx
+++ b/Notebook/CUPGE/S2/Anglais/Forensic.pptx
@@ -3805,7 +3805,7 @@
                   <a:schemeClr val="bg1"/>
                 </a:solidFill>
               </a:rPr>
-              <a:t>technic</a:t>
+              <a:t>techniques</a:t>
             </a:r>
             <a:endParaRPr>
               <a:solidFill>
@@ -3937,7 +3937,7 @@
       </p:sp>
       <p:pic>
         <p:nvPicPr>
-          <p:cNvPr id="2146186697" name=""/>
+          <p:cNvPr id="1328340988" name=""/>
           <p:cNvPicPr>
             <a:picLocks noChangeAspect="1"/>
           </p:cNvPicPr>
@@ -3948,9 +3948,9 @@
           <a:stretch/>
         </p:blipFill>
         <p:spPr bwMode="auto">
-          <a:xfrm>
-            <a:off x="838199" y="455001"/>
-            <a:ext cx="2647949" cy="5581649"/>
+          <a:xfrm flipH="0" flipV="0">
+            <a:off x="2509883" y="1825624"/>
+            <a:ext cx="7486650" cy="4259339"/>
           </a:xfrm>
           <a:prstGeom prst="rect">
             <a:avLst/>

</xml_diff>